<commit_message>
modified:   LAB_5/src/common/SlidesPanel.css 	modified:   LAB_5/src/common/Toolbar.css 	modified:   LAB_5/src/common/Toolbar.tsx 	modified:   LAB_5/src/common/Workspace.css 	modified:   LAB_5/src/common/Workspace.tsx 	modified:   LAB_5/src/store/editor.ts 	modified:   LAB_5/src/store/functions/presentation.ts 	modified:   LAB_5/src/store/templates/presentation.ts 	modified:   LAB_5/src/store/templates/slide.ts 	modified:   LAB_5/src/store/types/presentation.ts 	modified:   "\321\202\320\265\321\201\321\202\321\213.pptx"
</commit_message>
<xml_diff>
--- a/тесты.pptx
+++ b/тесты.pptx
@@ -7,10 +7,11 @@
   <p:sldIdLst>
     <p:sldId id="256" r:id="rId2"/>
     <p:sldId id="258" r:id="rId3"/>
-    <p:sldId id="259" r:id="rId4"/>
-    <p:sldId id="260" r:id="rId5"/>
-    <p:sldId id="261" r:id="rId6"/>
-    <p:sldId id="257" r:id="rId7"/>
+    <p:sldId id="262" r:id="rId4"/>
+    <p:sldId id="259" r:id="rId5"/>
+    <p:sldId id="260" r:id="rId6"/>
+    <p:sldId id="261" r:id="rId7"/>
+    <p:sldId id="257" r:id="rId8"/>
   </p:sldIdLst>
   <p:sldSz cx="12192000" cy="6858000"/>
   <p:notesSz cx="6858000" cy="9144000"/>
@@ -248,7 +249,7 @@
           <a:p>
             <a:fld id="{0C7C875C-CAA9-4A55-AC0A-00202CDD150A}" type="datetimeFigureOut">
               <a:rPr lang="ru-RU" smtClean="0"/>
-              <a:t>10.10.2025</a:t>
+              <a:t>13.10.2025</a:t>
             </a:fld>
             <a:endParaRPr lang="ru-RU"/>
           </a:p>
@@ -418,7 +419,7 @@
           <a:p>
             <a:fld id="{0C7C875C-CAA9-4A55-AC0A-00202CDD150A}" type="datetimeFigureOut">
               <a:rPr lang="ru-RU" smtClean="0"/>
-              <a:t>10.10.2025</a:t>
+              <a:t>13.10.2025</a:t>
             </a:fld>
             <a:endParaRPr lang="ru-RU"/>
           </a:p>
@@ -598,7 +599,7 @@
           <a:p>
             <a:fld id="{0C7C875C-CAA9-4A55-AC0A-00202CDD150A}" type="datetimeFigureOut">
               <a:rPr lang="ru-RU" smtClean="0"/>
-              <a:t>10.10.2025</a:t>
+              <a:t>13.10.2025</a:t>
             </a:fld>
             <a:endParaRPr lang="ru-RU"/>
           </a:p>
@@ -768,7 +769,7 @@
           <a:p>
             <a:fld id="{0C7C875C-CAA9-4A55-AC0A-00202CDD150A}" type="datetimeFigureOut">
               <a:rPr lang="ru-RU" smtClean="0"/>
-              <a:t>10.10.2025</a:t>
+              <a:t>13.10.2025</a:t>
             </a:fld>
             <a:endParaRPr lang="ru-RU"/>
           </a:p>
@@ -1014,7 +1015,7 @@
           <a:p>
             <a:fld id="{0C7C875C-CAA9-4A55-AC0A-00202CDD150A}" type="datetimeFigureOut">
               <a:rPr lang="ru-RU" smtClean="0"/>
-              <a:t>10.10.2025</a:t>
+              <a:t>13.10.2025</a:t>
             </a:fld>
             <a:endParaRPr lang="ru-RU"/>
           </a:p>
@@ -1246,7 +1247,7 @@
           <a:p>
             <a:fld id="{0C7C875C-CAA9-4A55-AC0A-00202CDD150A}" type="datetimeFigureOut">
               <a:rPr lang="ru-RU" smtClean="0"/>
-              <a:t>10.10.2025</a:t>
+              <a:t>13.10.2025</a:t>
             </a:fld>
             <a:endParaRPr lang="ru-RU"/>
           </a:p>
@@ -1613,7 +1614,7 @@
           <a:p>
             <a:fld id="{0C7C875C-CAA9-4A55-AC0A-00202CDD150A}" type="datetimeFigureOut">
               <a:rPr lang="ru-RU" smtClean="0"/>
-              <a:t>10.10.2025</a:t>
+              <a:t>13.10.2025</a:t>
             </a:fld>
             <a:endParaRPr lang="ru-RU"/>
           </a:p>
@@ -1731,7 +1732,7 @@
           <a:p>
             <a:fld id="{0C7C875C-CAA9-4A55-AC0A-00202CDD150A}" type="datetimeFigureOut">
               <a:rPr lang="ru-RU" smtClean="0"/>
-              <a:t>10.10.2025</a:t>
+              <a:t>13.10.2025</a:t>
             </a:fld>
             <a:endParaRPr lang="ru-RU"/>
           </a:p>
@@ -1826,7 +1827,7 @@
           <a:p>
             <a:fld id="{0C7C875C-CAA9-4A55-AC0A-00202CDD150A}" type="datetimeFigureOut">
               <a:rPr lang="ru-RU" smtClean="0"/>
-              <a:t>10.10.2025</a:t>
+              <a:t>13.10.2025</a:t>
             </a:fld>
             <a:endParaRPr lang="ru-RU"/>
           </a:p>
@@ -2103,7 +2104,7 @@
           <a:p>
             <a:fld id="{0C7C875C-CAA9-4A55-AC0A-00202CDD150A}" type="datetimeFigureOut">
               <a:rPr lang="ru-RU" smtClean="0"/>
-              <a:t>10.10.2025</a:t>
+              <a:t>13.10.2025</a:t>
             </a:fld>
             <a:endParaRPr lang="ru-RU"/>
           </a:p>
@@ -2356,7 +2357,7 @@
           <a:p>
             <a:fld id="{0C7C875C-CAA9-4A55-AC0A-00202CDD150A}" type="datetimeFigureOut">
               <a:rPr lang="ru-RU" smtClean="0"/>
-              <a:t>10.10.2025</a:t>
+              <a:t>13.10.2025</a:t>
             </a:fld>
             <a:endParaRPr lang="ru-RU"/>
           </a:p>
@@ -2569,7 +2570,7 @@
           <a:p>
             <a:fld id="{0C7C875C-CAA9-4A55-AC0A-00202CDD150A}" type="datetimeFigureOut">
               <a:rPr lang="ru-RU" smtClean="0"/>
-              <a:t>10.10.2025</a:t>
+              <a:t>13.10.2025</a:t>
             </a:fld>
             <a:endParaRPr lang="ru-RU"/>
           </a:p>
@@ -2990,10 +2991,26 @@
           <a:lstStyle/>
           <a:p>
             <a:r>
-              <a:rPr lang="ru-RU" smtClean="0"/>
-              <a:t>	цвйцу</a:t>
-            </a:r>
-            <a:endParaRPr lang="ru-RU" dirty="0"/>
+              <a:rPr lang="ru-RU" dirty="0" smtClean="0">
+                <a:solidFill>
+                  <a:srgbClr val="FF0000"/>
+                </a:solidFill>
+              </a:rPr>
+              <a:t>	</a:t>
+            </a:r>
+            <a:r>
+              <a:rPr lang="ru-RU" dirty="0" err="1" smtClean="0">
+                <a:solidFill>
+                  <a:srgbClr val="FF0000"/>
+                </a:solidFill>
+              </a:rPr>
+              <a:t>цвйцу</a:t>
+            </a:r>
+            <a:endParaRPr lang="ru-RU" dirty="0">
+              <a:solidFill>
+                <a:srgbClr val="FF0000"/>
+              </a:solidFill>
+            </a:endParaRPr>
           </a:p>
         </p:txBody>
       </p:sp>
@@ -3007,7 +3024,34 @@
             <p:ph type="subTitle" idx="1"/>
           </p:nvPr>
         </p:nvSpPr>
-        <p:spPr/>
+        <p:spPr>
+          <a:gradFill flip="none" rotWithShape="1">
+            <a:gsLst>
+              <a:gs pos="0">
+                <a:schemeClr val="accent1">
+                  <a:shade val="30000"/>
+                  <a:satMod val="115000"/>
+                </a:schemeClr>
+              </a:gs>
+              <a:gs pos="50000">
+                <a:schemeClr val="accent1">
+                  <a:shade val="67500"/>
+                  <a:satMod val="115000"/>
+                </a:schemeClr>
+              </a:gs>
+              <a:gs pos="100000">
+                <a:schemeClr val="accent1">
+                  <a:shade val="100000"/>
+                  <a:satMod val="115000"/>
+                </a:schemeClr>
+              </a:gs>
+            </a:gsLst>
+            <a:path path="circle">
+              <a:fillToRect l="50000" t="50000" r="50000" b="50000"/>
+            </a:path>
+            <a:tileRect/>
+          </a:gradFill>
+        </p:spPr>
         <p:txBody>
           <a:bodyPr/>
           <a:lstStyle/>
@@ -3061,7 +3105,7 @@
           <a:bodyPr/>
           <a:lstStyle/>
           <a:p>
-            <a:endParaRPr lang="ru-RU"/>
+            <a:endParaRPr lang="ru-RU" dirty="0"/>
           </a:p>
         </p:txBody>
       </p:sp>
@@ -3140,38 +3184,30 @@
             <a:spLocks noGrp="1"/>
           </p:cNvSpPr>
           <p:nvPr>
-            <p:ph type="title"/>
-          </p:nvPr>
-        </p:nvSpPr>
-        <p:spPr/>
-        <p:txBody>
-          <a:bodyPr/>
-          <a:lstStyle/>
-          <a:p>
-            <a:endParaRPr lang="ru-RU"/>
-          </a:p>
-        </p:txBody>
-      </p:sp>
-      <p:sp>
-        <p:nvSpPr>
-          <p:cNvPr id="3" name="Рисунок 2"/>
-          <p:cNvSpPr>
-            <a:spLocks noGrp="1"/>
-          </p:cNvSpPr>
-          <p:nvPr>
-            <p:ph type="pic" idx="1"/>
-          </p:nvPr>
-        </p:nvSpPr>
-        <p:spPr/>
-      </p:sp>
-      <p:sp>
-        <p:nvSpPr>
-          <p:cNvPr id="4" name="Текст 3"/>
-          <p:cNvSpPr>
-            <a:spLocks noGrp="1"/>
-          </p:cNvSpPr>
-          <p:nvPr>
-            <p:ph type="body" sz="half" idx="2"/>
+            <p:ph type="ctrTitle"/>
+          </p:nvPr>
+        </p:nvSpPr>
+        <p:spPr/>
+        <p:txBody>
+          <a:bodyPr/>
+          <a:lstStyle/>
+          <a:p>
+            <a:r>
+              <a:rPr lang="ru-RU" dirty="0" err="1" smtClean="0"/>
+              <a:t>впп</a:t>
+            </a:r>
+            <a:endParaRPr lang="ru-RU" dirty="0"/>
+          </a:p>
+        </p:txBody>
+      </p:sp>
+      <p:sp>
+        <p:nvSpPr>
+          <p:cNvPr id="3" name="Подзаголовок 2"/>
+          <p:cNvSpPr>
+            <a:spLocks noGrp="1"/>
+          </p:cNvSpPr>
+          <p:nvPr>
+            <p:ph type="subTitle" idx="1"/>
           </p:nvPr>
         </p:nvSpPr>
         <p:spPr/>
@@ -3186,7 +3222,7 @@
     </p:spTree>
     <p:extLst>
       <p:ext uri="{BB962C8B-B14F-4D97-AF65-F5344CB8AC3E}">
-        <p14:creationId xmlns:p14="http://schemas.microsoft.com/office/powerpoint/2010/main" val="3585856056"/>
+        <p14:creationId xmlns:p14="http://schemas.microsoft.com/office/powerpoint/2010/main" val="608362029"/>
       </p:ext>
     </p:extLst>
   </p:cSld>
@@ -3266,7 +3302,7 @@
     </p:spTree>
     <p:extLst>
       <p:ext uri="{BB962C8B-B14F-4D97-AF65-F5344CB8AC3E}">
-        <p14:creationId xmlns:p14="http://schemas.microsoft.com/office/powerpoint/2010/main" val="972901120"/>
+        <p14:creationId xmlns:p14="http://schemas.microsoft.com/office/powerpoint/2010/main" val="3585856056"/>
       </p:ext>
     </p:extLst>
   </p:cSld>
@@ -3346,6 +3382,86 @@
     </p:spTree>
     <p:extLst>
       <p:ext uri="{BB962C8B-B14F-4D97-AF65-F5344CB8AC3E}">
+        <p14:creationId xmlns:p14="http://schemas.microsoft.com/office/powerpoint/2010/main" val="972901120"/>
+      </p:ext>
+    </p:extLst>
+  </p:cSld>
+  <p:clrMapOvr>
+    <a:masterClrMapping/>
+  </p:clrMapOvr>
+</p:sld>
+</file>
+
+<file path=ppt/slides/slide6.xml><?xml version="1.0" encoding="utf-8"?>
+<p:sld xmlns:a="http://schemas.openxmlformats.org/drawingml/2006/main" xmlns:r="http://schemas.openxmlformats.org/officeDocument/2006/relationships" xmlns:p="http://schemas.openxmlformats.org/presentationml/2006/main">
+  <p:cSld>
+    <p:spTree>
+      <p:nvGrpSpPr>
+        <p:cNvPr id="1" name=""/>
+        <p:cNvGrpSpPr/>
+        <p:nvPr/>
+      </p:nvGrpSpPr>
+      <p:grpSpPr>
+        <a:xfrm>
+          <a:off x="0" y="0"/>
+          <a:ext cx="0" cy="0"/>
+          <a:chOff x="0" y="0"/>
+          <a:chExt cx="0" cy="0"/>
+        </a:xfrm>
+      </p:grpSpPr>
+      <p:sp>
+        <p:nvSpPr>
+          <p:cNvPr id="2" name="Заголовок 1"/>
+          <p:cNvSpPr>
+            <a:spLocks noGrp="1"/>
+          </p:cNvSpPr>
+          <p:nvPr>
+            <p:ph type="title"/>
+          </p:nvPr>
+        </p:nvSpPr>
+        <p:spPr/>
+        <p:txBody>
+          <a:bodyPr/>
+          <a:lstStyle/>
+          <a:p>
+            <a:endParaRPr lang="ru-RU"/>
+          </a:p>
+        </p:txBody>
+      </p:sp>
+      <p:sp>
+        <p:nvSpPr>
+          <p:cNvPr id="3" name="Рисунок 2"/>
+          <p:cNvSpPr>
+            <a:spLocks noGrp="1"/>
+          </p:cNvSpPr>
+          <p:nvPr>
+            <p:ph type="pic" idx="1"/>
+          </p:nvPr>
+        </p:nvSpPr>
+        <p:spPr/>
+      </p:sp>
+      <p:sp>
+        <p:nvSpPr>
+          <p:cNvPr id="4" name="Текст 3"/>
+          <p:cNvSpPr>
+            <a:spLocks noGrp="1"/>
+          </p:cNvSpPr>
+          <p:nvPr>
+            <p:ph type="body" sz="half" idx="2"/>
+          </p:nvPr>
+        </p:nvSpPr>
+        <p:spPr/>
+        <p:txBody>
+          <a:bodyPr/>
+          <a:lstStyle/>
+          <a:p>
+            <a:endParaRPr lang="ru-RU"/>
+          </a:p>
+        </p:txBody>
+      </p:sp>
+    </p:spTree>
+    <p:extLst>
+      <p:ext uri="{BB962C8B-B14F-4D97-AF65-F5344CB8AC3E}">
         <p14:creationId xmlns:p14="http://schemas.microsoft.com/office/powerpoint/2010/main" val="4286447619"/>
       </p:ext>
     </p:extLst>
@@ -3356,7 +3472,7 @@
 </p:sld>
 </file>
 
-<file path=ppt/slides/slide6.xml><?xml version="1.0" encoding="utf-8"?>
+<file path=ppt/slides/slide7.xml><?xml version="1.0" encoding="utf-8"?>
 <p:sld xmlns:a="http://schemas.openxmlformats.org/drawingml/2006/main" xmlns:r="http://schemas.openxmlformats.org/officeDocument/2006/relationships" xmlns:p="http://schemas.openxmlformats.org/presentationml/2006/main">
   <p:cSld>
     <p:spTree>

</xml_diff>